<commit_message>
Update README + Presentation
</commit_message>
<xml_diff>
--- a/docs/ADS507-Team6-Final-Project-Presentation.pptx
+++ b/docs/ADS507-Team6-Final-Project-Presentation.pptx
@@ -5,7 +5,7 @@
     <p:sldMasterId id="2147483661" r:id="rId1"/>
   </p:sldMasterIdLst>
   <p:notesMasterIdLst>
-    <p:notesMasterId r:id="rId12"/>
+    <p:notesMasterId r:id="rId17"/>
   </p:notesMasterIdLst>
   <p:sldIdLst>
     <p:sldId id="335" r:id="rId2"/>
@@ -13,11 +13,16 @@
     <p:sldId id="369" r:id="rId4"/>
     <p:sldId id="379" r:id="rId5"/>
     <p:sldId id="381" r:id="rId6"/>
-    <p:sldId id="382" r:id="rId7"/>
-    <p:sldId id="385" r:id="rId8"/>
-    <p:sldId id="386" r:id="rId9"/>
-    <p:sldId id="387" r:id="rId10"/>
-    <p:sldId id="367" r:id="rId11"/>
+    <p:sldId id="388" r:id="rId7"/>
+    <p:sldId id="389" r:id="rId8"/>
+    <p:sldId id="392" r:id="rId9"/>
+    <p:sldId id="390" r:id="rId10"/>
+    <p:sldId id="391" r:id="rId11"/>
+    <p:sldId id="382" r:id="rId12"/>
+    <p:sldId id="385" r:id="rId13"/>
+    <p:sldId id="386" r:id="rId14"/>
+    <p:sldId id="387" r:id="rId15"/>
+    <p:sldId id="367" r:id="rId16"/>
   </p:sldIdLst>
   <p:sldSz cx="9144000" cy="5143500" type="screen16x9"/>
   <p:notesSz cx="6858000" cy="9144000"/>
@@ -9803,18 +9808,13 @@
           <a:p>
             <a:pPr marL="0" lvl="0" indent="0"/>
             <a:r>
-              <a:rPr lang="en-US">
+              <a:rPr lang="en-US" dirty="0">
                 <a:solidFill>
                   <a:schemeClr val="tx1"/>
                 </a:solidFill>
               </a:rPr>
               <a:t>Lane Whitmore</a:t>
             </a:r>
-            <a:endParaRPr lang="en-US" dirty="0">
-              <a:solidFill>
-                <a:schemeClr val="tx1"/>
-              </a:solidFill>
-            </a:endParaRPr>
           </a:p>
           <a:p>
             <a:pPr marL="0" lvl="0" indent="0"/>
@@ -9873,6 +9873,523 @@
 </file>
 
 <file path=ppt/slides/slide10.xml><?xml version="1.0" encoding="utf-8"?>
+<p:sld xmlns:a="http://schemas.openxmlformats.org/drawingml/2006/main" xmlns:r="http://schemas.openxmlformats.org/officeDocument/2006/relationships" xmlns:p="http://schemas.openxmlformats.org/presentationml/2006/main">
+  <p:cSld>
+    <p:spTree>
+      <p:nvGrpSpPr>
+        <p:cNvPr id="1" name=""/>
+        <p:cNvGrpSpPr/>
+        <p:nvPr/>
+      </p:nvGrpSpPr>
+      <p:grpSpPr>
+        <a:xfrm>
+          <a:off x="0" y="0"/>
+          <a:ext cx="0" cy="0"/>
+          <a:chOff x="0" y="0"/>
+          <a:chExt cx="0" cy="0"/>
+        </a:xfrm>
+      </p:grpSpPr>
+      <p:sp>
+        <p:nvSpPr>
+          <p:cNvPr id="2" name="Title 1">
+            <a:extLst>
+              <a:ext uri="{FF2B5EF4-FFF2-40B4-BE49-F238E27FC236}">
+                <a16:creationId xmlns:a16="http://schemas.microsoft.com/office/drawing/2014/main" id="{58ACDD3C-8F64-20B1-72FA-3CD1A4B7A3E8}"/>
+              </a:ext>
+            </a:extLst>
+          </p:cNvPr>
+          <p:cNvSpPr>
+            <a:spLocks noGrp="1"/>
+          </p:cNvSpPr>
+          <p:nvPr>
+            <p:ph type="title"/>
+          </p:nvPr>
+        </p:nvSpPr>
+        <p:spPr/>
+        <p:txBody>
+          <a:bodyPr/>
+          <a:lstStyle/>
+          <a:p>
+            <a:endParaRPr lang="en-US"/>
+          </a:p>
+        </p:txBody>
+      </p:sp>
+      <p:sp>
+        <p:nvSpPr>
+          <p:cNvPr id="3" name="Text Placeholder 2">
+            <a:extLst>
+              <a:ext uri="{FF2B5EF4-FFF2-40B4-BE49-F238E27FC236}">
+                <a16:creationId xmlns:a16="http://schemas.microsoft.com/office/drawing/2014/main" id="{67D63B6E-3E17-A3FB-27F9-8E81F30EF60E}"/>
+              </a:ext>
+            </a:extLst>
+          </p:cNvPr>
+          <p:cNvSpPr>
+            <a:spLocks noGrp="1"/>
+          </p:cNvSpPr>
+          <p:nvPr>
+            <p:ph type="body" idx="1"/>
+          </p:nvPr>
+        </p:nvSpPr>
+        <p:spPr/>
+        <p:txBody>
+          <a:bodyPr/>
+          <a:lstStyle/>
+          <a:p>
+            <a:endParaRPr lang="en-US"/>
+          </a:p>
+        </p:txBody>
+      </p:sp>
+      <p:sp>
+        <p:nvSpPr>
+          <p:cNvPr id="4" name="Text Placeholder 3">
+            <a:extLst>
+              <a:ext uri="{FF2B5EF4-FFF2-40B4-BE49-F238E27FC236}">
+                <a16:creationId xmlns:a16="http://schemas.microsoft.com/office/drawing/2014/main" id="{CC73258B-5721-F60F-84BF-4F5EF2898F4E}"/>
+              </a:ext>
+            </a:extLst>
+          </p:cNvPr>
+          <p:cNvSpPr>
+            <a:spLocks noGrp="1"/>
+          </p:cNvSpPr>
+          <p:nvPr>
+            <p:ph type="body" sz="quarter" idx="13"/>
+          </p:nvPr>
+        </p:nvSpPr>
+        <p:spPr/>
+        <p:txBody>
+          <a:bodyPr/>
+          <a:lstStyle/>
+          <a:p>
+            <a:endParaRPr lang="en-US"/>
+          </a:p>
+        </p:txBody>
+      </p:sp>
+    </p:spTree>
+    <p:extLst>
+      <p:ext uri="{BB962C8B-B14F-4D97-AF65-F5344CB8AC3E}">
+        <p14:creationId xmlns:p14="http://schemas.microsoft.com/office/powerpoint/2010/main" val="3213545645"/>
+      </p:ext>
+    </p:extLst>
+  </p:cSld>
+  <p:clrMapOvr>
+    <a:masterClrMapping/>
+  </p:clrMapOvr>
+</p:sld>
+</file>
+
+<file path=ppt/slides/slide11.xml><?xml version="1.0" encoding="utf-8"?>
+<p:sld xmlns:a="http://schemas.openxmlformats.org/drawingml/2006/main" xmlns:r="http://schemas.openxmlformats.org/officeDocument/2006/relationships" xmlns:p="http://schemas.openxmlformats.org/presentationml/2006/main">
+  <p:cSld>
+    <p:spTree>
+      <p:nvGrpSpPr>
+        <p:cNvPr id="1" name=""/>
+        <p:cNvGrpSpPr/>
+        <p:nvPr/>
+      </p:nvGrpSpPr>
+      <p:grpSpPr>
+        <a:xfrm>
+          <a:off x="0" y="0"/>
+          <a:ext cx="0" cy="0"/>
+          <a:chOff x="0" y="0"/>
+          <a:chExt cx="0" cy="0"/>
+        </a:xfrm>
+      </p:grpSpPr>
+      <p:sp>
+        <p:nvSpPr>
+          <p:cNvPr id="2" name="Title 1">
+            <a:extLst>
+              <a:ext uri="{FF2B5EF4-FFF2-40B4-BE49-F238E27FC236}">
+                <a16:creationId xmlns:a16="http://schemas.microsoft.com/office/drawing/2014/main" id="{01DA1016-D399-82F8-F71E-0896B423BBEE}"/>
+              </a:ext>
+            </a:extLst>
+          </p:cNvPr>
+          <p:cNvSpPr>
+            <a:spLocks noGrp="1"/>
+          </p:cNvSpPr>
+          <p:nvPr>
+            <p:ph type="title"/>
+          </p:nvPr>
+        </p:nvSpPr>
+        <p:spPr/>
+        <p:txBody>
+          <a:bodyPr/>
+          <a:lstStyle/>
+          <a:p>
+            <a:r>
+              <a:rPr lang="en-US" dirty="0"/>
+              <a:t>BIS Database Design</a:t>
+            </a:r>
+            <a:br>
+              <a:rPr lang="en-US" dirty="0"/>
+            </a:br>
+            <a:r>
+              <a:rPr lang="en-US" sz="1800" b="0" dirty="0"/>
+              <a:t>Entity Relationship Diagram (ERD)</a:t>
+            </a:r>
+          </a:p>
+        </p:txBody>
+      </p:sp>
+      <p:pic>
+        <p:nvPicPr>
+          <p:cNvPr id="5" name="Picture 4" descr="Graphical user interface, text, chat or text message&#10;&#10;Description automatically generated">
+            <a:extLst>
+              <a:ext uri="{FF2B5EF4-FFF2-40B4-BE49-F238E27FC236}">
+                <a16:creationId xmlns:a16="http://schemas.microsoft.com/office/drawing/2014/main" id="{F959423A-573B-02A6-1C5C-126E54AA94AE}"/>
+              </a:ext>
+            </a:extLst>
+          </p:cNvPr>
+          <p:cNvPicPr>
+            <a:picLocks noChangeAspect="1"/>
+          </p:cNvPicPr>
+          <p:nvPr/>
+        </p:nvPicPr>
+        <p:blipFill>
+          <a:blip r:embed="rId2"/>
+          <a:stretch>
+            <a:fillRect/>
+          </a:stretch>
+        </p:blipFill>
+        <p:spPr>
+          <a:xfrm>
+            <a:off x="685800" y="1511351"/>
+            <a:ext cx="7772400" cy="3300679"/>
+          </a:xfrm>
+          <a:prstGeom prst="rect">
+            <a:avLst/>
+          </a:prstGeom>
+        </p:spPr>
+      </p:pic>
+    </p:spTree>
+    <p:extLst>
+      <p:ext uri="{BB962C8B-B14F-4D97-AF65-F5344CB8AC3E}">
+        <p14:creationId xmlns:p14="http://schemas.microsoft.com/office/powerpoint/2010/main" val="2889169274"/>
+      </p:ext>
+    </p:extLst>
+  </p:cSld>
+  <p:clrMapOvr>
+    <a:masterClrMapping/>
+  </p:clrMapOvr>
+</p:sld>
+</file>
+
+<file path=ppt/slides/slide12.xml><?xml version="1.0" encoding="utf-8"?>
+<p:sld xmlns:a="http://schemas.openxmlformats.org/drawingml/2006/main" xmlns:r="http://schemas.openxmlformats.org/officeDocument/2006/relationships" xmlns:p="http://schemas.openxmlformats.org/presentationml/2006/main">
+  <p:cSld>
+    <p:spTree>
+      <p:nvGrpSpPr>
+        <p:cNvPr id="1" name=""/>
+        <p:cNvGrpSpPr/>
+        <p:nvPr/>
+      </p:nvGrpSpPr>
+      <p:grpSpPr>
+        <a:xfrm>
+          <a:off x="0" y="0"/>
+          <a:ext cx="0" cy="0"/>
+          <a:chOff x="0" y="0"/>
+          <a:chExt cx="0" cy="0"/>
+        </a:xfrm>
+      </p:grpSpPr>
+      <p:sp>
+        <p:nvSpPr>
+          <p:cNvPr id="2" name="Title 1">
+            <a:extLst>
+              <a:ext uri="{FF2B5EF4-FFF2-40B4-BE49-F238E27FC236}">
+                <a16:creationId xmlns:a16="http://schemas.microsoft.com/office/drawing/2014/main" id="{A3EB6526-8724-A3D5-A201-D5C7D8E3D20C}"/>
+              </a:ext>
+            </a:extLst>
+          </p:cNvPr>
+          <p:cNvSpPr>
+            <a:spLocks noGrp="1"/>
+          </p:cNvSpPr>
+          <p:nvPr>
+            <p:ph type="title"/>
+          </p:nvPr>
+        </p:nvSpPr>
+        <p:spPr/>
+        <p:txBody>
+          <a:bodyPr/>
+          <a:lstStyle/>
+          <a:p>
+            <a:r>
+              <a:rPr lang="en-US" dirty="0"/>
+              <a:t>Non-Functionals</a:t>
+            </a:r>
+          </a:p>
+        </p:txBody>
+      </p:sp>
+      <p:sp>
+        <p:nvSpPr>
+          <p:cNvPr id="3" name="Text Placeholder 2">
+            <a:extLst>
+              <a:ext uri="{FF2B5EF4-FFF2-40B4-BE49-F238E27FC236}">
+                <a16:creationId xmlns:a16="http://schemas.microsoft.com/office/drawing/2014/main" id="{B4A10F44-7EFC-FDD9-C4C1-C1F3D4D1367A}"/>
+              </a:ext>
+            </a:extLst>
+          </p:cNvPr>
+          <p:cNvSpPr>
+            <a:spLocks noGrp="1"/>
+          </p:cNvSpPr>
+          <p:nvPr>
+            <p:ph type="body" idx="1"/>
+          </p:nvPr>
+        </p:nvSpPr>
+        <p:spPr/>
+        <p:txBody>
+          <a:bodyPr/>
+          <a:lstStyle/>
+          <a:p>
+            <a:r>
+              <a:rPr lang="en-US" b="1" dirty="0">
+                <a:solidFill>
+                  <a:srgbClr val="0070C0"/>
+                </a:solidFill>
+              </a:rPr>
+              <a:t>[. . .]</a:t>
+            </a:r>
+            <a:endParaRPr lang="en-US" dirty="0"/>
+          </a:p>
+        </p:txBody>
+      </p:sp>
+      <p:sp>
+        <p:nvSpPr>
+          <p:cNvPr id="4" name="Text Placeholder 3">
+            <a:extLst>
+              <a:ext uri="{FF2B5EF4-FFF2-40B4-BE49-F238E27FC236}">
+                <a16:creationId xmlns:a16="http://schemas.microsoft.com/office/drawing/2014/main" id="{4C76ECD3-A9EC-7D3B-F7AA-177C450D1EC0}"/>
+              </a:ext>
+            </a:extLst>
+          </p:cNvPr>
+          <p:cNvSpPr>
+            <a:spLocks noGrp="1"/>
+          </p:cNvSpPr>
+          <p:nvPr>
+            <p:ph type="body" sz="quarter" idx="13"/>
+          </p:nvPr>
+        </p:nvSpPr>
+        <p:spPr/>
+        <p:txBody>
+          <a:bodyPr/>
+          <a:lstStyle/>
+          <a:p>
+            <a:r>
+              <a:rPr lang="en-US" dirty="0"/>
+              <a:t>Security, Data Integrity,  Monitoring/Logging, and Scalability</a:t>
+            </a:r>
+          </a:p>
+        </p:txBody>
+      </p:sp>
+    </p:spTree>
+    <p:extLst>
+      <p:ext uri="{BB962C8B-B14F-4D97-AF65-F5344CB8AC3E}">
+        <p14:creationId xmlns:p14="http://schemas.microsoft.com/office/powerpoint/2010/main" val="598757014"/>
+      </p:ext>
+    </p:extLst>
+  </p:cSld>
+  <p:clrMapOvr>
+    <a:masterClrMapping/>
+  </p:clrMapOvr>
+</p:sld>
+</file>
+
+<file path=ppt/slides/slide13.xml><?xml version="1.0" encoding="utf-8"?>
+<p:sld xmlns:a="http://schemas.openxmlformats.org/drawingml/2006/main" xmlns:r="http://schemas.openxmlformats.org/officeDocument/2006/relationships" xmlns:p="http://schemas.openxmlformats.org/presentationml/2006/main">
+  <p:cSld>
+    <p:bg>
+      <p:bgPr>
+        <a:solidFill>
+          <a:srgbClr val="0070C0"/>
+        </a:solidFill>
+        <a:effectLst/>
+      </p:bgPr>
+    </p:bg>
+    <p:spTree>
+      <p:nvGrpSpPr>
+        <p:cNvPr id="1" name=""/>
+        <p:cNvGrpSpPr/>
+        <p:nvPr/>
+      </p:nvGrpSpPr>
+      <p:grpSpPr>
+        <a:xfrm>
+          <a:off x="0" y="0"/>
+          <a:ext cx="0" cy="0"/>
+          <a:chOff x="0" y="0"/>
+          <a:chExt cx="0" cy="0"/>
+        </a:xfrm>
+      </p:grpSpPr>
+      <p:sp>
+        <p:nvSpPr>
+          <p:cNvPr id="6" name="Text Placeholder 5">
+            <a:extLst>
+              <a:ext uri="{FF2B5EF4-FFF2-40B4-BE49-F238E27FC236}">
+                <a16:creationId xmlns:a16="http://schemas.microsoft.com/office/drawing/2014/main" id="{76E1A64D-88C5-7154-6D66-8D8FBD6AC959}"/>
+              </a:ext>
+            </a:extLst>
+          </p:cNvPr>
+          <p:cNvSpPr>
+            <a:spLocks noGrp="1"/>
+          </p:cNvSpPr>
+          <p:nvPr>
+            <p:ph type="body" idx="1"/>
+          </p:nvPr>
+        </p:nvSpPr>
+        <p:spPr>
+          <a:xfrm>
+            <a:off x="609600" y="1108710"/>
+            <a:ext cx="7924800" cy="2933700"/>
+          </a:xfrm>
+        </p:spPr>
+        <p:txBody>
+          <a:bodyPr anchor="ctr"/>
+          <a:lstStyle/>
+          <a:p>
+            <a:pPr marL="114300" indent="0" algn="ctr">
+              <a:buNone/>
+            </a:pPr>
+            <a:r>
+              <a:rPr lang="en-US" sz="5400" b="1" dirty="0">
+                <a:solidFill>
+                  <a:schemeClr val="bg1"/>
+                </a:solidFill>
+              </a:rPr>
+              <a:t>Demo</a:t>
+            </a:r>
+          </a:p>
+        </p:txBody>
+      </p:sp>
+    </p:spTree>
+    <p:extLst>
+      <p:ext uri="{BB962C8B-B14F-4D97-AF65-F5344CB8AC3E}">
+        <p14:creationId xmlns:p14="http://schemas.microsoft.com/office/powerpoint/2010/main" val="3855147692"/>
+      </p:ext>
+    </p:extLst>
+  </p:cSld>
+  <p:clrMapOvr>
+    <a:masterClrMapping/>
+  </p:clrMapOvr>
+</p:sld>
+</file>
+
+<file path=ppt/slides/slide14.xml><?xml version="1.0" encoding="utf-8"?>
+<p:sld xmlns:a="http://schemas.openxmlformats.org/drawingml/2006/main" xmlns:r="http://schemas.openxmlformats.org/officeDocument/2006/relationships" xmlns:p="http://schemas.openxmlformats.org/presentationml/2006/main">
+  <p:cSld>
+    <p:spTree>
+      <p:nvGrpSpPr>
+        <p:cNvPr id="1" name=""/>
+        <p:cNvGrpSpPr/>
+        <p:nvPr/>
+      </p:nvGrpSpPr>
+      <p:grpSpPr>
+        <a:xfrm>
+          <a:off x="0" y="0"/>
+          <a:ext cx="0" cy="0"/>
+          <a:chOff x="0" y="0"/>
+          <a:chExt cx="0" cy="0"/>
+        </a:xfrm>
+      </p:grpSpPr>
+      <p:sp>
+        <p:nvSpPr>
+          <p:cNvPr id="2" name="Title 1">
+            <a:extLst>
+              <a:ext uri="{FF2B5EF4-FFF2-40B4-BE49-F238E27FC236}">
+                <a16:creationId xmlns:a16="http://schemas.microsoft.com/office/drawing/2014/main" id="{29B56964-9D4C-6884-2DC5-721286929ED9}"/>
+              </a:ext>
+            </a:extLst>
+          </p:cNvPr>
+          <p:cNvSpPr>
+            <a:spLocks noGrp="1"/>
+          </p:cNvSpPr>
+          <p:nvPr>
+            <p:ph type="title"/>
+          </p:nvPr>
+        </p:nvSpPr>
+        <p:spPr/>
+        <p:txBody>
+          <a:bodyPr/>
+          <a:lstStyle/>
+          <a:p>
+            <a:r>
+              <a:rPr lang="en-US" dirty="0"/>
+              <a:t>Wrap-up</a:t>
+            </a:r>
+          </a:p>
+        </p:txBody>
+      </p:sp>
+      <p:sp>
+        <p:nvSpPr>
+          <p:cNvPr id="3" name="Text Placeholder 2">
+            <a:extLst>
+              <a:ext uri="{FF2B5EF4-FFF2-40B4-BE49-F238E27FC236}">
+                <a16:creationId xmlns:a16="http://schemas.microsoft.com/office/drawing/2014/main" id="{44621436-45F4-61DA-39DC-7652C20CBFB9}"/>
+              </a:ext>
+            </a:extLst>
+          </p:cNvPr>
+          <p:cNvSpPr>
+            <a:spLocks noGrp="1"/>
+          </p:cNvSpPr>
+          <p:nvPr>
+            <p:ph type="body" idx="1"/>
+          </p:nvPr>
+        </p:nvSpPr>
+        <p:spPr/>
+        <p:txBody>
+          <a:bodyPr/>
+          <a:lstStyle/>
+          <a:p>
+            <a:r>
+              <a:rPr lang="en-US" dirty="0"/>
+              <a:t>[. . .]</a:t>
+            </a:r>
+          </a:p>
+        </p:txBody>
+      </p:sp>
+      <p:sp>
+        <p:nvSpPr>
+          <p:cNvPr id="4" name="Text Placeholder 3">
+            <a:extLst>
+              <a:ext uri="{FF2B5EF4-FFF2-40B4-BE49-F238E27FC236}">
+                <a16:creationId xmlns:a16="http://schemas.microsoft.com/office/drawing/2014/main" id="{602DA5C9-7D0B-F552-7ACC-2C6B73997A14}"/>
+              </a:ext>
+            </a:extLst>
+          </p:cNvPr>
+          <p:cNvSpPr>
+            <a:spLocks noGrp="1"/>
+          </p:cNvSpPr>
+          <p:nvPr>
+            <p:ph type="body" sz="quarter" idx="13"/>
+          </p:nvPr>
+        </p:nvSpPr>
+        <p:spPr/>
+        <p:txBody>
+          <a:bodyPr/>
+          <a:lstStyle/>
+          <a:p>
+            <a:r>
+              <a:rPr lang="en-US" dirty="0"/>
+              <a:t>Gaps and</a:t>
+            </a:r>
+          </a:p>
+          <a:p>
+            <a:r>
+              <a:rPr lang="en-US" dirty="0"/>
+              <a:t>extensibility</a:t>
+            </a:r>
+          </a:p>
+        </p:txBody>
+      </p:sp>
+    </p:spTree>
+    <p:extLst>
+      <p:ext uri="{BB962C8B-B14F-4D97-AF65-F5344CB8AC3E}">
+        <p14:creationId xmlns:p14="http://schemas.microsoft.com/office/powerpoint/2010/main" val="3241294105"/>
+      </p:ext>
+    </p:extLst>
+  </p:cSld>
+  <p:clrMapOvr>
+    <a:masterClrMapping/>
+  </p:clrMapOvr>
+</p:sld>
+</file>
+
+<file path=ppt/slides/slide15.xml><?xml version="1.0" encoding="utf-8"?>
 <p:sld xmlns:a="http://schemas.openxmlformats.org/drawingml/2006/main" xmlns:r="http://schemas.openxmlformats.org/officeDocument/2006/relationships" xmlns:p="http://schemas.openxmlformats.org/presentationml/2006/main">
   <p:cSld>
     <p:spTree>
@@ -10138,7 +10655,7 @@
             </a:r>
             <a:r>
               <a:rPr lang="en-US" dirty="0"/>
-              <a:t> – Security, Data Integrity, 	Monitoring/Logging, and Scalability</a:t>
+              <a:t> – security, data integrity, 	monitoring/logging, and scalability</a:t>
             </a:r>
           </a:p>
           <a:p>
@@ -10595,7 +11112,7 @@
                   <a:srgbClr val="0070C0"/>
                 </a:solidFill>
               </a:rPr>
-              <a:t>include US dollar exchange rates</a:t>
+              <a:t>includes US dollar exchange rates</a:t>
             </a:r>
             <a:r>
               <a:rPr lang="en-US" dirty="0">
@@ -10813,10 +11330,10 @@
       </p:sp>
       <p:grpSp>
         <p:nvGrpSpPr>
-          <p:cNvPr id="50" name="Group 49">
+          <p:cNvPr id="25" name="Group 24">
             <a:extLst>
               <a:ext uri="{FF2B5EF4-FFF2-40B4-BE49-F238E27FC236}">
-                <a16:creationId xmlns:a16="http://schemas.microsoft.com/office/drawing/2014/main" id="{1EE0915B-A4CE-C236-BD08-FB5BD91CEC1B}"/>
+                <a16:creationId xmlns:a16="http://schemas.microsoft.com/office/drawing/2014/main" id="{27326A61-2D40-93D2-5B03-819955BD77F0}"/>
               </a:ext>
             </a:extLst>
           </p:cNvPr>
@@ -10942,7 +11459,7 @@
             <a:p>
               <a:pPr algn="ctr"/>
               <a:r>
-                <a:rPr lang="en-US" sz="1100" i="1" dirty="0"/>
+                <a:rPr lang="en-US" sz="900" i="1" dirty="0"/>
                 <a:t>(.csv)</a:t>
               </a:r>
             </a:p>
@@ -11015,7 +11532,7 @@
             <a:p>
               <a:pPr algn="ctr"/>
               <a:r>
-                <a:rPr lang="en-US" sz="1100" i="1" dirty="0"/>
+                <a:rPr lang="en-US" sz="900" i="1" dirty="0"/>
                 <a:t>(.zip)</a:t>
               </a:r>
             </a:p>
@@ -11088,9 +11605,10 @@
             <a:p>
               <a:pPr algn="ctr"/>
               <a:r>
-                <a:rPr lang="en-US" sz="1100" i="1" dirty="0"/>
+                <a:rPr lang="en-US" sz="900" i="1" dirty="0"/>
                 <a:t>(MySQL)</a:t>
               </a:r>
+              <a:endParaRPr lang="en-US" sz="1100" i="1" dirty="0"/>
             </a:p>
           </p:txBody>
         </p:sp>
@@ -11231,7 +11749,18 @@
                     <a:srgbClr val="595959"/>
                   </a:solidFill>
                 </a:rPr>
-                <a:t>Reporting</a:t>
+                <a:t>Service</a:t>
+              </a:r>
+            </a:p>
+            <a:p>
+              <a:pPr algn="ctr"/>
+              <a:r>
+                <a:rPr lang="en-US" sz="1100" dirty="0">
+                  <a:solidFill>
+                    <a:srgbClr val="595959"/>
+                  </a:solidFill>
+                </a:rPr>
+                <a:t>Endpoints</a:t>
               </a:r>
             </a:p>
           </p:txBody>
@@ -11760,6 +12289,13 @@
               <a:r>
                 <a:rPr lang="en-US" sz="1100" dirty="0"/>
                 <a:t>download</a:t>
+              </a:r>
+            </a:p>
+            <a:p>
+              <a:pPr algn="ctr"/>
+              <a:r>
+                <a:rPr lang="en-US" sz="900" i="1" dirty="0"/>
+                <a:t>(Python)</a:t>
               </a:r>
             </a:p>
           </p:txBody>
@@ -12451,8 +12987,8 @@
           </p:nvSpPr>
           <p:spPr>
             <a:xfrm>
-              <a:off x="2880360" y="2023110"/>
-              <a:ext cx="1463040" cy="365760"/>
+              <a:off x="1874520" y="2023110"/>
+              <a:ext cx="3474720" cy="365760"/>
             </a:xfrm>
             <a:prstGeom prst="rect">
               <a:avLst/>
@@ -12489,7 +13025,7 @@
                     <a:srgbClr val="F26522"/>
                   </a:solidFill>
                 </a:rPr>
-                <a:t>Functional Process</a:t>
+                <a:t>“Cron-triggered” and Automated Functional Process</a:t>
               </a:r>
             </a:p>
           </p:txBody>
@@ -12555,11 +13091,81 @@
             </a:p>
           </p:txBody>
         </p:sp>
+        <p:sp>
+          <p:nvSpPr>
+            <p:cNvPr id="8" name="Rectangle 7">
+              <a:extLst>
+                <a:ext uri="{FF2B5EF4-FFF2-40B4-BE49-F238E27FC236}">
+                  <a16:creationId xmlns:a16="http://schemas.microsoft.com/office/drawing/2014/main" id="{ADBB9D03-32A4-23CA-D5D6-767A30126400}"/>
+                </a:ext>
+              </a:extLst>
+            </p:cNvPr>
+            <p:cNvSpPr/>
+            <p:nvPr/>
+          </p:nvSpPr>
+          <p:spPr>
+            <a:xfrm>
+              <a:off x="1737360" y="4034790"/>
+              <a:ext cx="3749040" cy="457200"/>
+            </a:xfrm>
+            <a:prstGeom prst="rect">
+              <a:avLst/>
+            </a:prstGeom>
+            <a:solidFill>
+              <a:schemeClr val="bg1"/>
+            </a:solidFill>
+            <a:ln>
+              <a:noFill/>
+            </a:ln>
+          </p:spPr>
+          <p:style>
+            <a:lnRef idx="2">
+              <a:schemeClr val="accent1">
+                <a:shade val="50000"/>
+              </a:schemeClr>
+            </a:lnRef>
+            <a:fillRef idx="1">
+              <a:schemeClr val="accent1"/>
+            </a:fillRef>
+            <a:effectRef idx="0">
+              <a:schemeClr val="accent1"/>
+            </a:effectRef>
+            <a:fontRef idx="minor">
+              <a:schemeClr val="lt1"/>
+            </a:fontRef>
+          </p:style>
+          <p:txBody>
+            <a:bodyPr rtlCol="0" anchor="ctr"/>
+            <a:lstStyle/>
+            <a:p>
+              <a:pPr algn="ctr"/>
+              <a:r>
+                <a:rPr lang="en-US" sz="1100" dirty="0">
+                  <a:solidFill>
+                    <a:srgbClr val="F26522"/>
+                  </a:solidFill>
+                </a:rPr>
+                <a:t>Scalability and Extensibility</a:t>
+              </a:r>
+            </a:p>
+            <a:p>
+              <a:pPr algn="ctr"/>
+              <a:r>
+                <a:rPr lang="en-US" sz="1100" dirty="0">
+                  <a:solidFill>
+                    <a:srgbClr val="F26522"/>
+                  </a:solidFill>
+                </a:rPr>
+                <a:t>leveraging relational data and “cloud-compatible” tooling</a:t>
+              </a:r>
+            </a:p>
+          </p:txBody>
+        </p:sp>
       </p:grpSp>
     </p:spTree>
     <p:extLst>
       <p:ext uri="{BB962C8B-B14F-4D97-AF65-F5344CB8AC3E}">
-        <p14:creationId xmlns:p14="http://schemas.microsoft.com/office/powerpoint/2010/main" val="1639121655"/>
+        <p14:creationId xmlns:p14="http://schemas.microsoft.com/office/powerpoint/2010/main" val="453322264"/>
       </p:ext>
     </p:extLst>
   </p:cSld>
@@ -12591,7 +13197,7 @@
           <p:cNvPr id="2" name="Title 1">
             <a:extLst>
               <a:ext uri="{FF2B5EF4-FFF2-40B4-BE49-F238E27FC236}">
-                <a16:creationId xmlns:a16="http://schemas.microsoft.com/office/drawing/2014/main" id="{01DA1016-D399-82F8-F71E-0896B423BBEE}"/>
+                <a16:creationId xmlns:a16="http://schemas.microsoft.com/office/drawing/2014/main" id="{4072AA40-EB13-CD59-740C-8AD3DA20F805}"/>
               </a:ext>
             </a:extLst>
           </p:cNvPr>
@@ -12607,54 +13213,64 @@
           <a:bodyPr/>
           <a:lstStyle/>
           <a:p>
-            <a:r>
-              <a:rPr lang="en-US" dirty="0"/>
-              <a:t>BIS Database Design</a:t>
-            </a:r>
-            <a:br>
-              <a:rPr lang="en-US" dirty="0"/>
-            </a:br>
-            <a:r>
-              <a:rPr lang="en-US" sz="1800" b="0" dirty="0"/>
-              <a:t>Entity Relationship Diagram (ERD)</a:t>
-            </a:r>
+            <a:endParaRPr lang="en-US"/>
           </a:p>
         </p:txBody>
       </p:sp>
-      <p:pic>
-        <p:nvPicPr>
-          <p:cNvPr id="5" name="Picture 4" descr="Graphical user interface, text, chat or text message&#10;&#10;Description automatically generated">
+      <p:sp>
+        <p:nvSpPr>
+          <p:cNvPr id="3" name="Text Placeholder 2">
             <a:extLst>
               <a:ext uri="{FF2B5EF4-FFF2-40B4-BE49-F238E27FC236}">
-                <a16:creationId xmlns:a16="http://schemas.microsoft.com/office/drawing/2014/main" id="{F959423A-573B-02A6-1C5C-126E54AA94AE}"/>
+                <a16:creationId xmlns:a16="http://schemas.microsoft.com/office/drawing/2014/main" id="{F7869030-B99E-DF6D-C0E1-0095E60F8139}"/>
               </a:ext>
             </a:extLst>
           </p:cNvPr>
-          <p:cNvPicPr>
-            <a:picLocks noChangeAspect="1"/>
-          </p:cNvPicPr>
-          <p:nvPr/>
-        </p:nvPicPr>
-        <p:blipFill>
-          <a:blip r:embed="rId2"/>
-          <a:stretch>
-            <a:fillRect/>
-          </a:stretch>
-        </p:blipFill>
-        <p:spPr>
-          <a:xfrm>
-            <a:off x="685800" y="1511351"/>
-            <a:ext cx="7772400" cy="3300679"/>
-          </a:xfrm>
-          <a:prstGeom prst="rect">
-            <a:avLst/>
-          </a:prstGeom>
-        </p:spPr>
-      </p:pic>
+          <p:cNvSpPr>
+            <a:spLocks noGrp="1"/>
+          </p:cNvSpPr>
+          <p:nvPr>
+            <p:ph type="body" idx="1"/>
+          </p:nvPr>
+        </p:nvSpPr>
+        <p:spPr/>
+        <p:txBody>
+          <a:bodyPr/>
+          <a:lstStyle/>
+          <a:p>
+            <a:endParaRPr lang="en-US"/>
+          </a:p>
+        </p:txBody>
+      </p:sp>
+      <p:sp>
+        <p:nvSpPr>
+          <p:cNvPr id="4" name="Text Placeholder 3">
+            <a:extLst>
+              <a:ext uri="{FF2B5EF4-FFF2-40B4-BE49-F238E27FC236}">
+                <a16:creationId xmlns:a16="http://schemas.microsoft.com/office/drawing/2014/main" id="{B1E8FA9F-7980-050E-A6BE-BAD89F293B58}"/>
+              </a:ext>
+            </a:extLst>
+          </p:cNvPr>
+          <p:cNvSpPr>
+            <a:spLocks noGrp="1"/>
+          </p:cNvSpPr>
+          <p:nvPr>
+            <p:ph type="body" sz="quarter" idx="13"/>
+          </p:nvPr>
+        </p:nvSpPr>
+        <p:spPr/>
+        <p:txBody>
+          <a:bodyPr/>
+          <a:lstStyle/>
+          <a:p>
+            <a:endParaRPr lang="en-US"/>
+          </a:p>
+        </p:txBody>
+      </p:sp>
     </p:spTree>
     <p:extLst>
       <p:ext uri="{BB962C8B-B14F-4D97-AF65-F5344CB8AC3E}">
-        <p14:creationId xmlns:p14="http://schemas.microsoft.com/office/powerpoint/2010/main" val="2889169274"/>
+        <p14:creationId xmlns:p14="http://schemas.microsoft.com/office/powerpoint/2010/main" val="1670365207"/>
       </p:ext>
     </p:extLst>
   </p:cSld>
@@ -12686,7 +13302,7 @@
           <p:cNvPr id="2" name="Title 1">
             <a:extLst>
               <a:ext uri="{FF2B5EF4-FFF2-40B4-BE49-F238E27FC236}">
-                <a16:creationId xmlns:a16="http://schemas.microsoft.com/office/drawing/2014/main" id="{A3EB6526-8724-A3D5-A201-D5C7D8E3D20C}"/>
+                <a16:creationId xmlns:a16="http://schemas.microsoft.com/office/drawing/2014/main" id="{2B44E82B-FE50-CCCF-25D2-53862CAFFBFF}"/>
               </a:ext>
             </a:extLst>
           </p:cNvPr>
@@ -12702,10 +13318,7 @@
           <a:bodyPr/>
           <a:lstStyle/>
           <a:p>
-            <a:r>
-              <a:rPr lang="en-US" dirty="0"/>
-              <a:t>Non-Functionals</a:t>
-            </a:r>
+            <a:endParaRPr lang="en-US"/>
           </a:p>
         </p:txBody>
       </p:sp>
@@ -12714,7 +13327,7 @@
           <p:cNvPr id="3" name="Text Placeholder 2">
             <a:extLst>
               <a:ext uri="{FF2B5EF4-FFF2-40B4-BE49-F238E27FC236}">
-                <a16:creationId xmlns:a16="http://schemas.microsoft.com/office/drawing/2014/main" id="{B4A10F44-7EFC-FDD9-C4C1-C1F3D4D1367A}"/>
+                <a16:creationId xmlns:a16="http://schemas.microsoft.com/office/drawing/2014/main" id="{D0A7967F-0719-7664-FDBE-E9B027F69E76}"/>
               </a:ext>
             </a:extLst>
           </p:cNvPr>
@@ -12730,15 +13343,7 @@
           <a:bodyPr/>
           <a:lstStyle/>
           <a:p>
-            <a:r>
-              <a:rPr lang="en-US" b="1" dirty="0">
-                <a:solidFill>
-                  <a:srgbClr val="0070C0"/>
-                </a:solidFill>
-              </a:rPr>
-              <a:t>[. . .]</a:t>
-            </a:r>
-            <a:endParaRPr lang="en-US" dirty="0"/>
+            <a:endParaRPr lang="en-US"/>
           </a:p>
         </p:txBody>
       </p:sp>
@@ -12747,7 +13352,7 @@
           <p:cNvPr id="4" name="Text Placeholder 3">
             <a:extLst>
               <a:ext uri="{FF2B5EF4-FFF2-40B4-BE49-F238E27FC236}">
-                <a16:creationId xmlns:a16="http://schemas.microsoft.com/office/drawing/2014/main" id="{4C76ECD3-A9EC-7D3B-F7AA-177C450D1EC0}"/>
+                <a16:creationId xmlns:a16="http://schemas.microsoft.com/office/drawing/2014/main" id="{CCB5367C-BFB6-054D-1E25-FC8CBB0DCA3E}"/>
               </a:ext>
             </a:extLst>
           </p:cNvPr>
@@ -12763,17 +13368,14 @@
           <a:bodyPr/>
           <a:lstStyle/>
           <a:p>
-            <a:r>
-              <a:rPr lang="en-US" dirty="0"/>
-              <a:t>Security, Data Integrity,  Monitoring/Logging, and Scalability</a:t>
-            </a:r>
+            <a:endParaRPr lang="en-US"/>
           </a:p>
         </p:txBody>
       </p:sp>
     </p:spTree>
     <p:extLst>
       <p:ext uri="{BB962C8B-B14F-4D97-AF65-F5344CB8AC3E}">
-        <p14:creationId xmlns:p14="http://schemas.microsoft.com/office/powerpoint/2010/main" val="598757014"/>
+        <p14:creationId xmlns:p14="http://schemas.microsoft.com/office/powerpoint/2010/main" val="3417225103"/>
       </p:ext>
     </p:extLst>
   </p:cSld>
@@ -12786,14 +13388,6 @@
 <file path=ppt/slides/slide8.xml><?xml version="1.0" encoding="utf-8"?>
 <p:sld xmlns:a="http://schemas.openxmlformats.org/drawingml/2006/main" xmlns:r="http://schemas.openxmlformats.org/officeDocument/2006/relationships" xmlns:p="http://schemas.openxmlformats.org/presentationml/2006/main">
   <p:cSld>
-    <p:bg>
-      <p:bgPr>
-        <a:solidFill>
-          <a:srgbClr val="0070C0"/>
-        </a:solidFill>
-        <a:effectLst/>
-      </p:bgPr>
-    </p:bg>
     <p:spTree>
       <p:nvGrpSpPr>
         <p:cNvPr id="1" name=""/>
@@ -12810,10 +13404,35 @@
       </p:grpSpPr>
       <p:sp>
         <p:nvSpPr>
-          <p:cNvPr id="6" name="Text Placeholder 5">
+          <p:cNvPr id="2" name="Title 1">
             <a:extLst>
               <a:ext uri="{FF2B5EF4-FFF2-40B4-BE49-F238E27FC236}">
-                <a16:creationId xmlns:a16="http://schemas.microsoft.com/office/drawing/2014/main" id="{76E1A64D-88C5-7154-6D66-8D8FBD6AC959}"/>
+                <a16:creationId xmlns:a16="http://schemas.microsoft.com/office/drawing/2014/main" id="{D81C52E9-D720-085B-1A16-31A7A8A90427}"/>
+              </a:ext>
+            </a:extLst>
+          </p:cNvPr>
+          <p:cNvSpPr>
+            <a:spLocks noGrp="1"/>
+          </p:cNvSpPr>
+          <p:nvPr>
+            <p:ph type="title"/>
+          </p:nvPr>
+        </p:nvSpPr>
+        <p:spPr/>
+        <p:txBody>
+          <a:bodyPr/>
+          <a:lstStyle/>
+          <a:p>
+            <a:endParaRPr lang="en-US"/>
+          </a:p>
+        </p:txBody>
+      </p:sp>
+      <p:sp>
+        <p:nvSpPr>
+          <p:cNvPr id="3" name="Text Placeholder 2">
+            <a:extLst>
+              <a:ext uri="{FF2B5EF4-FFF2-40B4-BE49-F238E27FC236}">
+                <a16:creationId xmlns:a16="http://schemas.microsoft.com/office/drawing/2014/main" id="{69ABCC34-62D1-CBAC-C4DB-2FC1762E9416}"/>
               </a:ext>
             </a:extLst>
           </p:cNvPr>
@@ -12824,34 +13443,44 @@
             <p:ph type="body" idx="1"/>
           </p:nvPr>
         </p:nvSpPr>
-        <p:spPr>
-          <a:xfrm>
-            <a:off x="609600" y="1108710"/>
-            <a:ext cx="7924800" cy="2933700"/>
-          </a:xfrm>
-        </p:spPr>
+        <p:spPr/>
         <p:txBody>
-          <a:bodyPr anchor="ctr"/>
+          <a:bodyPr/>
           <a:lstStyle/>
           <a:p>
-            <a:pPr marL="114300" indent="0" algn="ctr">
-              <a:buNone/>
-            </a:pPr>
-            <a:r>
-              <a:rPr lang="en-US" sz="5400" b="1" dirty="0">
-                <a:solidFill>
-                  <a:schemeClr val="bg1"/>
-                </a:solidFill>
-              </a:rPr>
-              <a:t>Demo</a:t>
-            </a:r>
+            <a:endParaRPr lang="en-US"/>
+          </a:p>
+        </p:txBody>
+      </p:sp>
+      <p:sp>
+        <p:nvSpPr>
+          <p:cNvPr id="4" name="Text Placeholder 3">
+            <a:extLst>
+              <a:ext uri="{FF2B5EF4-FFF2-40B4-BE49-F238E27FC236}">
+                <a16:creationId xmlns:a16="http://schemas.microsoft.com/office/drawing/2014/main" id="{3795E638-BBC7-2FE5-AF91-50D5DBAF80A5}"/>
+              </a:ext>
+            </a:extLst>
+          </p:cNvPr>
+          <p:cNvSpPr>
+            <a:spLocks noGrp="1"/>
+          </p:cNvSpPr>
+          <p:nvPr>
+            <p:ph type="body" sz="quarter" idx="13"/>
+          </p:nvPr>
+        </p:nvSpPr>
+        <p:spPr/>
+        <p:txBody>
+          <a:bodyPr/>
+          <a:lstStyle/>
+          <a:p>
+            <a:endParaRPr lang="en-US"/>
           </a:p>
         </p:txBody>
       </p:sp>
     </p:spTree>
     <p:extLst>
       <p:ext uri="{BB962C8B-B14F-4D97-AF65-F5344CB8AC3E}">
-        <p14:creationId xmlns:p14="http://schemas.microsoft.com/office/powerpoint/2010/main" val="3855147692"/>
+        <p14:creationId xmlns:p14="http://schemas.microsoft.com/office/powerpoint/2010/main" val="2140171740"/>
       </p:ext>
     </p:extLst>
   </p:cSld>
@@ -12883,7 +13512,7 @@
           <p:cNvPr id="2" name="Title 1">
             <a:extLst>
               <a:ext uri="{FF2B5EF4-FFF2-40B4-BE49-F238E27FC236}">
-                <a16:creationId xmlns:a16="http://schemas.microsoft.com/office/drawing/2014/main" id="{29B56964-9D4C-6884-2DC5-721286929ED9}"/>
+                <a16:creationId xmlns:a16="http://schemas.microsoft.com/office/drawing/2014/main" id="{4F21118F-D9C2-8567-7F1B-B61EE187E7D1}"/>
               </a:ext>
             </a:extLst>
           </p:cNvPr>
@@ -12899,10 +13528,7 @@
           <a:bodyPr/>
           <a:lstStyle/>
           <a:p>
-            <a:r>
-              <a:rPr lang="en-US" dirty="0"/>
-              <a:t>Wrap-up</a:t>
-            </a:r>
+            <a:endParaRPr lang="en-US"/>
           </a:p>
         </p:txBody>
       </p:sp>
@@ -12911,7 +13537,7 @@
           <p:cNvPr id="3" name="Text Placeholder 2">
             <a:extLst>
               <a:ext uri="{FF2B5EF4-FFF2-40B4-BE49-F238E27FC236}">
-                <a16:creationId xmlns:a16="http://schemas.microsoft.com/office/drawing/2014/main" id="{44621436-45F4-61DA-39DC-7652C20CBFB9}"/>
+                <a16:creationId xmlns:a16="http://schemas.microsoft.com/office/drawing/2014/main" id="{FCB026AC-287D-D558-74D2-066D80E7389B}"/>
               </a:ext>
             </a:extLst>
           </p:cNvPr>
@@ -12927,10 +13553,7 @@
           <a:bodyPr/>
           <a:lstStyle/>
           <a:p>
-            <a:r>
-              <a:rPr lang="en-US" dirty="0"/>
-              <a:t>[. . .]</a:t>
-            </a:r>
+            <a:endParaRPr lang="en-US"/>
           </a:p>
         </p:txBody>
       </p:sp>
@@ -12939,7 +13562,7 @@
           <p:cNvPr id="4" name="Text Placeholder 3">
             <a:extLst>
               <a:ext uri="{FF2B5EF4-FFF2-40B4-BE49-F238E27FC236}">
-                <a16:creationId xmlns:a16="http://schemas.microsoft.com/office/drawing/2014/main" id="{602DA5C9-7D0B-F552-7ACC-2C6B73997A14}"/>
+                <a16:creationId xmlns:a16="http://schemas.microsoft.com/office/drawing/2014/main" id="{AED843FE-8A4B-5417-F74D-3A9D65069404}"/>
               </a:ext>
             </a:extLst>
           </p:cNvPr>
@@ -12955,23 +13578,14 @@
           <a:bodyPr/>
           <a:lstStyle/>
           <a:p>
-            <a:r>
-              <a:rPr lang="en-US" dirty="0"/>
-              <a:t>Gaps and</a:t>
-            </a:r>
-          </a:p>
-          <a:p>
-            <a:r>
-              <a:rPr lang="en-US" dirty="0"/>
-              <a:t>extensibility</a:t>
-            </a:r>
+            <a:endParaRPr lang="en-US"/>
           </a:p>
         </p:txBody>
       </p:sp>
     </p:spTree>
     <p:extLst>
       <p:ext uri="{BB962C8B-B14F-4D97-AF65-F5344CB8AC3E}">
-        <p14:creationId xmlns:p14="http://schemas.microsoft.com/office/powerpoint/2010/main" val="3241294105"/>
+        <p14:creationId xmlns:p14="http://schemas.microsoft.com/office/powerpoint/2010/main" val="3859873225"/>
       </p:ext>
     </p:extLst>
   </p:cSld>

</xml_diff>